<commit_message>
:wrench: updates figures of legendre_expression
</commit_message>
<xml_diff>
--- a/articles/legendre_expression/fig.pptx
+++ b/articles/legendre_expression/fig.pptx
@@ -215,7 +215,7 @@
             <a:fld id="{D2C63D3F-0352-EF45-A95C-C8137A1B6577}" type="datetimeFigureOut">
               <a:rPr lang="ja-JP" altLang="en-US" smtClean="0"/>
               <a:pPr/>
-              <a:t>2022/3/17</a:t>
+              <a:t>2026/1/7</a:t>
             </a:fld>
             <a:endParaRPr lang="ja-JP" altLang="en-US"/>
           </a:p>
@@ -2182,8 +2182,8 @@
           </a:p>
         </p:txBody>
       </p:sp>
-      <mc:AlternateContent xmlns:mc="http://schemas.openxmlformats.org/markup-compatibility/2006">
-        <mc:Choice xmlns:a14="http://schemas.microsoft.com/office/drawing/2010/main" Requires="a14">
+      <mc:AlternateContent xmlns:mc="http://schemas.openxmlformats.org/markup-compatibility/2006" xmlns:a14="http://schemas.microsoft.com/office/drawing/2010/main">
+        <mc:Choice Requires="a14">
           <p:sp>
             <p:nvSpPr>
               <p:cNvPr id="8" name="テキスト ボックス 7">
@@ -2233,7 +2233,7 @@
             </p:txBody>
           </p:sp>
         </mc:Choice>
-        <mc:Fallback>
+        <mc:Fallback xmlns="">
           <p:sp>
             <p:nvSpPr>
               <p:cNvPr id="8" name="テキスト ボックス 7">
@@ -2278,8 +2278,8 @@
           </p:sp>
         </mc:Fallback>
       </mc:AlternateContent>
-      <mc:AlternateContent xmlns:mc="http://schemas.openxmlformats.org/markup-compatibility/2006">
-        <mc:Choice xmlns:a14="http://schemas.microsoft.com/office/drawing/2010/main" Requires="a14">
+      <mc:AlternateContent xmlns:mc="http://schemas.openxmlformats.org/markup-compatibility/2006" xmlns:a14="http://schemas.microsoft.com/office/drawing/2010/main">
+        <mc:Choice Requires="a14">
           <p:sp>
             <p:nvSpPr>
               <p:cNvPr id="9" name="テキスト ボックス 8">
@@ -2329,7 +2329,7 @@
             </p:txBody>
           </p:sp>
         </mc:Choice>
-        <mc:Fallback>
+        <mc:Fallback xmlns="">
           <p:sp>
             <p:nvSpPr>
               <p:cNvPr id="9" name="テキスト ボックス 8">
@@ -2374,8 +2374,8 @@
           </p:sp>
         </mc:Fallback>
       </mc:AlternateContent>
-      <mc:AlternateContent xmlns:mc="http://schemas.openxmlformats.org/markup-compatibility/2006">
-        <mc:Choice xmlns:a14="http://schemas.microsoft.com/office/drawing/2010/main" Requires="a14">
+      <mc:AlternateContent xmlns:mc="http://schemas.openxmlformats.org/markup-compatibility/2006" xmlns:a14="http://schemas.microsoft.com/office/drawing/2010/main">
+        <mc:Choice Requires="a14">
           <p:sp>
             <p:nvSpPr>
               <p:cNvPr id="10" name="テキスト ボックス 9">
@@ -2449,7 +2449,7 @@
             </p:txBody>
           </p:sp>
         </mc:Choice>
-        <mc:Fallback>
+        <mc:Fallback xmlns="">
           <p:sp>
             <p:nvSpPr>
               <p:cNvPr id="10" name="テキスト ボックス 9">
@@ -2539,8 +2539,8 @@
           </a:fontRef>
         </p:style>
       </p:cxnSp>
-      <mc:AlternateContent xmlns:mc="http://schemas.openxmlformats.org/markup-compatibility/2006">
-        <mc:Choice xmlns:a14="http://schemas.microsoft.com/office/drawing/2010/main" Requires="a14">
+      <mc:AlternateContent xmlns:mc="http://schemas.openxmlformats.org/markup-compatibility/2006" xmlns:a14="http://schemas.microsoft.com/office/drawing/2010/main">
+        <mc:Choice Requires="a14">
           <p:sp>
             <p:nvSpPr>
               <p:cNvPr id="12" name="テキスト ボックス 11">
@@ -2590,7 +2590,7 @@
             </p:txBody>
           </p:sp>
         </mc:Choice>
-        <mc:Fallback>
+        <mc:Fallback xmlns="">
           <p:sp>
             <p:nvSpPr>
               <p:cNvPr id="12" name="テキスト ボックス 11">
@@ -2635,8 +2635,8 @@
           </p:sp>
         </mc:Fallback>
       </mc:AlternateContent>
-      <mc:AlternateContent xmlns:mc="http://schemas.openxmlformats.org/markup-compatibility/2006">
-        <mc:Choice xmlns:a14="http://schemas.microsoft.com/office/drawing/2010/main" Requires="a14">
+      <mc:AlternateContent xmlns:mc="http://schemas.openxmlformats.org/markup-compatibility/2006" xmlns:a14="http://schemas.microsoft.com/office/drawing/2010/main">
+        <mc:Choice Requires="a14">
           <p:sp>
             <p:nvSpPr>
               <p:cNvPr id="13" name="テキスト ボックス 12">
@@ -2716,7 +2716,7 @@
             </p:txBody>
           </p:sp>
         </mc:Choice>
-        <mc:Fallback>
+        <mc:Fallback xmlns="">
           <p:sp>
             <p:nvSpPr>
               <p:cNvPr id="13" name="テキスト ボックス 12">
@@ -2917,8 +2917,8 @@
           </a:p>
         </p:txBody>
       </p:sp>
-      <mc:AlternateContent xmlns:mc="http://schemas.openxmlformats.org/markup-compatibility/2006">
-        <mc:Choice xmlns:a14="http://schemas.microsoft.com/office/drawing/2010/main" Requires="a14">
+      <mc:AlternateContent xmlns:mc="http://schemas.openxmlformats.org/markup-compatibility/2006" xmlns:a14="http://schemas.microsoft.com/office/drawing/2010/main">
+        <mc:Choice Requires="a14">
           <p:sp>
             <p:nvSpPr>
               <p:cNvPr id="5" name="テキスト ボックス 4">
@@ -2997,7 +2997,7 @@
             </p:txBody>
           </p:sp>
         </mc:Choice>
-        <mc:Fallback>
+        <mc:Fallback xmlns="">
           <p:sp>
             <p:nvSpPr>
               <p:cNvPr id="5" name="テキスト ボックス 4">
@@ -3042,8 +3042,8 @@
           </p:sp>
         </mc:Fallback>
       </mc:AlternateContent>
-      <mc:AlternateContent xmlns:mc="http://schemas.openxmlformats.org/markup-compatibility/2006">
-        <mc:Choice xmlns:a14="http://schemas.microsoft.com/office/drawing/2010/main" Requires="a14">
+      <mc:AlternateContent xmlns:mc="http://schemas.openxmlformats.org/markup-compatibility/2006" xmlns:a14="http://schemas.microsoft.com/office/drawing/2010/main">
+        <mc:Choice Requires="a14">
           <p:sp>
             <p:nvSpPr>
               <p:cNvPr id="6" name="テキスト ボックス 5">
@@ -3093,7 +3093,7 @@
             </p:txBody>
           </p:sp>
         </mc:Choice>
-        <mc:Fallback>
+        <mc:Fallback xmlns="">
           <p:sp>
             <p:nvSpPr>
               <p:cNvPr id="6" name="テキスト ボックス 5">
@@ -3314,8 +3314,8 @@
           </a:fontRef>
         </p:style>
       </p:cxnSp>
-      <mc:AlternateContent xmlns:mc="http://schemas.openxmlformats.org/markup-compatibility/2006">
-        <mc:Choice xmlns:a14="http://schemas.microsoft.com/office/drawing/2010/main" Requires="a14">
+      <mc:AlternateContent xmlns:mc="http://schemas.openxmlformats.org/markup-compatibility/2006" xmlns:a14="http://schemas.microsoft.com/office/drawing/2010/main">
+        <mc:Choice Requires="a14">
           <p:sp>
             <p:nvSpPr>
               <p:cNvPr id="10" name="テキスト ボックス 9">
@@ -3382,7 +3382,7 @@
             </p:txBody>
           </p:sp>
         </mc:Choice>
-        <mc:Fallback>
+        <mc:Fallback xmlns="">
           <p:sp>
             <p:nvSpPr>
               <p:cNvPr id="10" name="テキスト ボックス 9">
@@ -3427,8 +3427,8 @@
           </p:sp>
         </mc:Fallback>
       </mc:AlternateContent>
-      <mc:AlternateContent xmlns:mc="http://schemas.openxmlformats.org/markup-compatibility/2006">
-        <mc:Choice xmlns:a14="http://schemas.microsoft.com/office/drawing/2010/main" Requires="a14">
+      <mc:AlternateContent xmlns:mc="http://schemas.openxmlformats.org/markup-compatibility/2006" xmlns:a14="http://schemas.microsoft.com/office/drawing/2010/main">
+        <mc:Choice Requires="a14">
           <p:sp>
             <p:nvSpPr>
               <p:cNvPr id="11" name="テキスト ボックス 10">
@@ -3478,7 +3478,7 @@
             </p:txBody>
           </p:sp>
         </mc:Choice>
-        <mc:Fallback>
+        <mc:Fallback xmlns="">
           <p:sp>
             <p:nvSpPr>
               <p:cNvPr id="11" name="テキスト ボックス 10">
@@ -3523,8 +3523,8 @@
           </p:sp>
         </mc:Fallback>
       </mc:AlternateContent>
-      <mc:AlternateContent xmlns:mc="http://schemas.openxmlformats.org/markup-compatibility/2006">
-        <mc:Choice xmlns:a14="http://schemas.microsoft.com/office/drawing/2010/main" Requires="a14">
+      <mc:AlternateContent xmlns:mc="http://schemas.openxmlformats.org/markup-compatibility/2006" xmlns:a14="http://schemas.microsoft.com/office/drawing/2010/main">
+        <mc:Choice Requires="a14">
           <p:sp>
             <p:nvSpPr>
               <p:cNvPr id="12" name="テキスト ボックス 11">
@@ -3603,7 +3603,7 @@
             </p:txBody>
           </p:sp>
         </mc:Choice>
-        <mc:Fallback>
+        <mc:Fallback xmlns="">
           <p:sp>
             <p:nvSpPr>
               <p:cNvPr id="12" name="テキスト ボックス 11">
@@ -3648,8 +3648,8 @@
           </p:sp>
         </mc:Fallback>
       </mc:AlternateContent>
-      <mc:AlternateContent xmlns:mc="http://schemas.openxmlformats.org/markup-compatibility/2006">
-        <mc:Choice xmlns:a14="http://schemas.microsoft.com/office/drawing/2010/main" Requires="a14">
+      <mc:AlternateContent xmlns:mc="http://schemas.openxmlformats.org/markup-compatibility/2006" xmlns:a14="http://schemas.microsoft.com/office/drawing/2010/main">
+        <mc:Choice Requires="a14">
           <p:sp>
             <p:nvSpPr>
               <p:cNvPr id="13" name="テキスト ボックス 12">
@@ -3699,7 +3699,7 @@
             </p:txBody>
           </p:sp>
         </mc:Choice>
-        <mc:Fallback>
+        <mc:Fallback xmlns="">
           <p:sp>
             <p:nvSpPr>
               <p:cNvPr id="13" name="テキスト ボックス 12">
@@ -3744,8 +3744,8 @@
           </p:sp>
         </mc:Fallback>
       </mc:AlternateContent>
-      <mc:AlternateContent xmlns:mc="http://schemas.openxmlformats.org/markup-compatibility/2006">
-        <mc:Choice xmlns:a14="http://schemas.microsoft.com/office/drawing/2010/main" Requires="a14">
+      <mc:AlternateContent xmlns:mc="http://schemas.openxmlformats.org/markup-compatibility/2006" xmlns:a14="http://schemas.microsoft.com/office/drawing/2010/main">
+        <mc:Choice Requires="a14">
           <p:sp>
             <p:nvSpPr>
               <p:cNvPr id="14" name="テキスト ボックス 13">
@@ -3795,7 +3795,7 @@
             </p:txBody>
           </p:sp>
         </mc:Choice>
-        <mc:Fallback>
+        <mc:Fallback xmlns="">
           <p:sp>
             <p:nvSpPr>
               <p:cNvPr id="14" name="テキスト ボックス 13">
@@ -3840,8 +3840,8 @@
           </p:sp>
         </mc:Fallback>
       </mc:AlternateContent>
-      <mc:AlternateContent xmlns:mc="http://schemas.openxmlformats.org/markup-compatibility/2006">
-        <mc:Choice xmlns:a14="http://schemas.microsoft.com/office/drawing/2010/main" Requires="a14">
+      <mc:AlternateContent xmlns:mc="http://schemas.openxmlformats.org/markup-compatibility/2006" xmlns:a14="http://schemas.microsoft.com/office/drawing/2010/main">
+        <mc:Choice Requires="a14">
           <p:sp>
             <p:nvSpPr>
               <p:cNvPr id="15" name="テキスト ボックス 14">
@@ -3908,7 +3908,7 @@
             </p:txBody>
           </p:sp>
         </mc:Choice>
-        <mc:Fallback>
+        <mc:Fallback xmlns="">
           <p:sp>
             <p:nvSpPr>
               <p:cNvPr id="15" name="テキスト ボックス 14">
@@ -4152,8 +4152,8 @@
           </a:p>
         </p:txBody>
       </p:sp>
-      <mc:AlternateContent xmlns:mc="http://schemas.openxmlformats.org/markup-compatibility/2006">
-        <mc:Choice xmlns:a14="http://schemas.microsoft.com/office/drawing/2010/main" Requires="a14">
+      <mc:AlternateContent xmlns:mc="http://schemas.openxmlformats.org/markup-compatibility/2006" xmlns:a14="http://schemas.microsoft.com/office/drawing/2010/main">
+        <mc:Choice Requires="a14">
           <p:sp>
             <p:nvSpPr>
               <p:cNvPr id="5" name="テキスト ボックス 4">
@@ -4203,7 +4203,7 @@
             </p:txBody>
           </p:sp>
         </mc:Choice>
-        <mc:Fallback>
+        <mc:Fallback xmlns="">
           <p:sp>
             <p:nvSpPr>
               <p:cNvPr id="5" name="テキスト ボックス 4">
@@ -4428,8 +4428,8 @@
           </a:fontRef>
         </p:style>
       </p:cxnSp>
-      <mc:AlternateContent xmlns:mc="http://schemas.openxmlformats.org/markup-compatibility/2006">
-        <mc:Choice xmlns:a14="http://schemas.microsoft.com/office/drawing/2010/main" Requires="a14">
+      <mc:AlternateContent xmlns:mc="http://schemas.openxmlformats.org/markup-compatibility/2006" xmlns:a14="http://schemas.microsoft.com/office/drawing/2010/main">
+        <mc:Choice Requires="a14">
           <p:sp>
             <p:nvSpPr>
               <p:cNvPr id="9" name="テキスト ボックス 8">
@@ -4479,7 +4479,7 @@
             </p:txBody>
           </p:sp>
         </mc:Choice>
-        <mc:Fallback>
+        <mc:Fallback xmlns="">
           <p:sp>
             <p:nvSpPr>
               <p:cNvPr id="9" name="テキスト ボックス 8">
@@ -4524,8 +4524,8 @@
           </p:sp>
         </mc:Fallback>
       </mc:AlternateContent>
-      <mc:AlternateContent xmlns:mc="http://schemas.openxmlformats.org/markup-compatibility/2006">
-        <mc:Choice xmlns:a14="http://schemas.microsoft.com/office/drawing/2010/main" Requires="a14">
+      <mc:AlternateContent xmlns:mc="http://schemas.openxmlformats.org/markup-compatibility/2006" xmlns:a14="http://schemas.microsoft.com/office/drawing/2010/main">
+        <mc:Choice Requires="a14">
           <p:sp>
             <p:nvSpPr>
               <p:cNvPr id="10" name="テキスト ボックス 9">
@@ -4575,7 +4575,7 @@
             </p:txBody>
           </p:sp>
         </mc:Choice>
-        <mc:Fallback>
+        <mc:Fallback xmlns="">
           <p:sp>
             <p:nvSpPr>
               <p:cNvPr id="10" name="テキスト ボックス 9">
@@ -4620,8 +4620,8 @@
           </p:sp>
         </mc:Fallback>
       </mc:AlternateContent>
-      <mc:AlternateContent xmlns:mc="http://schemas.openxmlformats.org/markup-compatibility/2006">
-        <mc:Choice xmlns:a14="http://schemas.microsoft.com/office/drawing/2010/main" Requires="a14">
+      <mc:AlternateContent xmlns:mc="http://schemas.openxmlformats.org/markup-compatibility/2006" xmlns:a14="http://schemas.microsoft.com/office/drawing/2010/main">
+        <mc:Choice Requires="a14">
           <p:sp>
             <p:nvSpPr>
               <p:cNvPr id="11" name="テキスト ボックス 10">
@@ -4671,7 +4671,7 @@
             </p:txBody>
           </p:sp>
         </mc:Choice>
-        <mc:Fallback>
+        <mc:Fallback xmlns="">
           <p:sp>
             <p:nvSpPr>
               <p:cNvPr id="11" name="テキスト ボックス 10">
@@ -4761,8 +4761,8 @@
           </a:fontRef>
         </p:style>
       </p:cxnSp>
-      <mc:AlternateContent xmlns:mc="http://schemas.openxmlformats.org/markup-compatibility/2006">
-        <mc:Choice xmlns:a14="http://schemas.microsoft.com/office/drawing/2010/main" Requires="a14">
+      <mc:AlternateContent xmlns:mc="http://schemas.openxmlformats.org/markup-compatibility/2006" xmlns:a14="http://schemas.microsoft.com/office/drawing/2010/main">
+        <mc:Choice Requires="a14">
           <p:sp>
             <p:nvSpPr>
               <p:cNvPr id="13" name="テキスト ボックス 12">
@@ -4877,7 +4877,7 @@
             </p:txBody>
           </p:sp>
         </mc:Choice>
-        <mc:Fallback>
+        <mc:Fallback xmlns="">
           <p:sp>
             <p:nvSpPr>
               <p:cNvPr id="13" name="テキスト ボックス 12">
@@ -5003,7 +5003,7 @@
                             <a:rPr kumimoji="1" lang="en-US" altLang="ja-JP" sz="2400" b="0" i="1" smtClean="0">
                               <a:latin typeface="Cambria Math" panose="02040503050406030204" pitchFamily="18" charset="0"/>
                             </a:rPr>
-                            <m:t>𝐹</m:t>
+                            <m:t>𝑔</m:t>
                           </m:r>
                           <m:d>
                             <m:dPr>
@@ -5064,7 +5064,7 @@
               <a:blipFill>
                 <a:blip r:embed="rId8"/>
                 <a:stretch>
-                  <a:fillRect/>
+                  <a:fillRect l="-32934" t="-184848" r="-2994" b="-269697"/>
                 </a:stretch>
               </a:blipFill>
             </p:spPr>
@@ -5129,8 +5129,8 @@
           </a:fontRef>
         </p:style>
       </p:cxnSp>
-      <mc:AlternateContent xmlns:mc="http://schemas.openxmlformats.org/markup-compatibility/2006">
-        <mc:Choice xmlns:a14="http://schemas.microsoft.com/office/drawing/2010/main" Requires="a14">
+      <mc:AlternateContent xmlns:mc="http://schemas.openxmlformats.org/markup-compatibility/2006" xmlns:a14="http://schemas.microsoft.com/office/drawing/2010/main">
+        <mc:Choice Requires="a14">
           <p:sp>
             <p:nvSpPr>
               <p:cNvPr id="16" name="テキスト ボックス 15">
@@ -5204,7 +5204,7 @@
             </p:txBody>
           </p:sp>
         </mc:Choice>
-        <mc:Fallback>
+        <mc:Fallback xmlns="">
           <p:sp>
             <p:nvSpPr>
               <p:cNvPr id="16" name="テキスト ボックス 15">
@@ -5801,8 +5801,8 @@
           </a:fontRef>
         </p:style>
       </p:cxnSp>
-      <mc:AlternateContent xmlns:mc="http://schemas.openxmlformats.org/markup-compatibility/2006">
-        <mc:Choice xmlns:a14="http://schemas.microsoft.com/office/drawing/2010/main" Requires="a14">
+      <mc:AlternateContent xmlns:mc="http://schemas.openxmlformats.org/markup-compatibility/2006" xmlns:a14="http://schemas.microsoft.com/office/drawing/2010/main">
+        <mc:Choice Requires="a14">
           <p:sp>
             <p:nvSpPr>
               <p:cNvPr id="29" name="テキスト ボックス 28">
@@ -5881,7 +5881,7 @@
             </p:txBody>
           </p:sp>
         </mc:Choice>
-        <mc:Fallback>
+        <mc:Fallback xmlns="">
           <p:sp>
             <p:nvSpPr>
               <p:cNvPr id="29" name="テキスト ボックス 28">
@@ -5926,8 +5926,8 @@
           </p:sp>
         </mc:Fallback>
       </mc:AlternateContent>
-      <mc:AlternateContent xmlns:mc="http://schemas.openxmlformats.org/markup-compatibility/2006">
-        <mc:Choice xmlns:a14="http://schemas.microsoft.com/office/drawing/2010/main" Requires="a14">
+      <mc:AlternateContent xmlns:mc="http://schemas.openxmlformats.org/markup-compatibility/2006" xmlns:a14="http://schemas.microsoft.com/office/drawing/2010/main">
+        <mc:Choice Requires="a14">
           <p:sp>
             <p:nvSpPr>
               <p:cNvPr id="30" name="テキスト ボックス 29">
@@ -6006,7 +6006,7 @@
             </p:txBody>
           </p:sp>
         </mc:Choice>
-        <mc:Fallback>
+        <mc:Fallback xmlns="">
           <p:sp>
             <p:nvSpPr>
               <p:cNvPr id="30" name="テキスト ボックス 29">

</xml_diff>